<commit_message>
add presentations and update
</commit_message>
<xml_diff>
--- a/04.RegEx.pptx
+++ b/04.RegEx.pptx
@@ -1019,7 +1019,7 @@
   <pc:docChgLst>
     <pc:chgData name="NORBEY DANILO MUÑOZ CAÑON" userId="29f64d73-8b12-4c53-a9f3-1c223397a229" providerId="ADAL" clId="{4388DCB9-A524-4FE6-B06A-8DB47F491E85}"/>
     <pc:docChg chg="undo custSel addSld delSld modSld sldOrd">
-      <pc:chgData name="NORBEY DANILO MUÑOZ CAÑON" userId="29f64d73-8b12-4c53-a9f3-1c223397a229" providerId="ADAL" clId="{4388DCB9-A524-4FE6-B06A-8DB47F491E85}" dt="2023-10-13T22:31:25.621" v="129" actId="20577"/>
+      <pc:chgData name="NORBEY DANILO MUÑOZ CAÑON" userId="29f64d73-8b12-4c53-a9f3-1c223397a229" providerId="ADAL" clId="{4388DCB9-A524-4FE6-B06A-8DB47F491E85}" dt="2023-10-17T16:59:31.399" v="133" actId="20577"/>
       <pc:docMkLst>
         <pc:docMk/>
       </pc:docMkLst>
@@ -1103,12 +1103,20 @@
           </ac:spMkLst>
         </pc:spChg>
       </pc:sldChg>
-      <pc:sldChg chg="modNotesTx">
-        <pc:chgData name="NORBEY DANILO MUÑOZ CAÑON" userId="29f64d73-8b12-4c53-a9f3-1c223397a229" providerId="ADAL" clId="{4388DCB9-A524-4FE6-B06A-8DB47F491E85}" dt="2023-10-12T20:17:35.022" v="72" actId="20577"/>
+      <pc:sldChg chg="modSp mod modNotesTx">
+        <pc:chgData name="NORBEY DANILO MUÑOZ CAÑON" userId="29f64d73-8b12-4c53-a9f3-1c223397a229" providerId="ADAL" clId="{4388DCB9-A524-4FE6-B06A-8DB47F491E85}" dt="2023-10-17T16:59:31.399" v="133" actId="20577"/>
         <pc:sldMkLst>
           <pc:docMk/>
           <pc:sldMk cId="587208273" sldId="278"/>
         </pc:sldMkLst>
+        <pc:spChg chg="mod">
+          <ac:chgData name="NORBEY DANILO MUÑOZ CAÑON" userId="29f64d73-8b12-4c53-a9f3-1c223397a229" providerId="ADAL" clId="{4388DCB9-A524-4FE6-B06A-8DB47F491E85}" dt="2023-10-17T16:59:31.399" v="133" actId="20577"/>
+          <ac:spMkLst>
+            <pc:docMk/>
+            <pc:sldMk cId="587208273" sldId="278"/>
+            <ac:spMk id="124" creationId="{00000000-0000-0000-0000-000000000000}"/>
+          </ac:spMkLst>
+        </pc:spChg>
       </pc:sldChg>
       <pc:sldChg chg="modNotesTx">
         <pc:chgData name="NORBEY DANILO MUÑOZ CAÑON" userId="29f64d73-8b12-4c53-a9f3-1c223397a229" providerId="ADAL" clId="{4388DCB9-A524-4FE6-B06A-8DB47F491E85}" dt="2023-10-12T22:50:14.951" v="116" actId="20577"/>
@@ -8298,7 +8306,7 @@
           <a:p>
             <a:fld id="{1D8BD707-D9CF-40AE-B4C6-C98DA3205C09}" type="datetimeFigureOut">
               <a:rPr lang="en-US"/>
-              <a:t>10/13/2023</a:t>
+              <a:t>10/17/2023</a:t>
             </a:fld>
             <a:endParaRPr lang="en-US"/>
           </a:p>
@@ -12649,7 +12657,7 @@
             </a:r>
             <a:r>
               <a:rPr lang="es-ES" dirty="0"/>
-              <a:t> o asma. Cadenas como “sabina”, “casualidad” o “as” no contienen el patrón.</a:t>
+              <a:t> o asma. Cadenas como “sabina” o “as” no contienen el patrón.</a:t>
             </a:r>
           </a:p>
           <a:p>

</xml_diff>